<commit_message>
Added a top-level grammar folder for the cql.g4 file.
</commit_message>
<xml_diff>
--- a/CQL/Documents/CQL_Technical_Introduction_20140604.pptx
+++ b/CQL/Documents/CQL_Technical_Introduction_20140604.pptx
@@ -327,7 +327,7 @@
           <a:p>
             <a:fld id="{AE358F06-F08A-4581-9382-C6FEB46FADBD}" type="datetimeFigureOut">
               <a:rPr lang="en-US" smtClean="0"/>
-              <a:t>6/10/2014</a:t>
+              <a:t>6/13/2014</a:t>
             </a:fld>
             <a:endParaRPr lang="en-US"/>
           </a:p>
@@ -497,7 +497,7 @@
           <a:p>
             <a:fld id="{AE358F06-F08A-4581-9382-C6FEB46FADBD}" type="datetimeFigureOut">
               <a:rPr lang="en-US" smtClean="0"/>
-              <a:t>6/10/2014</a:t>
+              <a:t>6/13/2014</a:t>
             </a:fld>
             <a:endParaRPr lang="en-US"/>
           </a:p>
@@ -677,7 +677,7 @@
           <a:p>
             <a:fld id="{AE358F06-F08A-4581-9382-C6FEB46FADBD}" type="datetimeFigureOut">
               <a:rPr lang="en-US" smtClean="0"/>
-              <a:t>6/10/2014</a:t>
+              <a:t>6/13/2014</a:t>
             </a:fld>
             <a:endParaRPr lang="en-US"/>
           </a:p>
@@ -847,7 +847,7 @@
           <a:p>
             <a:fld id="{AE358F06-F08A-4581-9382-C6FEB46FADBD}" type="datetimeFigureOut">
               <a:rPr lang="en-US" smtClean="0"/>
-              <a:t>6/10/2014</a:t>
+              <a:t>6/13/2014</a:t>
             </a:fld>
             <a:endParaRPr lang="en-US"/>
           </a:p>
@@ -1093,7 +1093,7 @@
           <a:p>
             <a:fld id="{AE358F06-F08A-4581-9382-C6FEB46FADBD}" type="datetimeFigureOut">
               <a:rPr lang="en-US" smtClean="0"/>
-              <a:t>6/10/2014</a:t>
+              <a:t>6/13/2014</a:t>
             </a:fld>
             <a:endParaRPr lang="en-US"/>
           </a:p>
@@ -1381,7 +1381,7 @@
           <a:p>
             <a:fld id="{AE358F06-F08A-4581-9382-C6FEB46FADBD}" type="datetimeFigureOut">
               <a:rPr lang="en-US" smtClean="0"/>
-              <a:t>6/10/2014</a:t>
+              <a:t>6/13/2014</a:t>
             </a:fld>
             <a:endParaRPr lang="en-US"/>
           </a:p>
@@ -1803,7 +1803,7 @@
           <a:p>
             <a:fld id="{AE358F06-F08A-4581-9382-C6FEB46FADBD}" type="datetimeFigureOut">
               <a:rPr lang="en-US" smtClean="0"/>
-              <a:t>6/10/2014</a:t>
+              <a:t>6/13/2014</a:t>
             </a:fld>
             <a:endParaRPr lang="en-US"/>
           </a:p>
@@ -1921,7 +1921,7 @@
           <a:p>
             <a:fld id="{AE358F06-F08A-4581-9382-C6FEB46FADBD}" type="datetimeFigureOut">
               <a:rPr lang="en-US" smtClean="0"/>
-              <a:t>6/10/2014</a:t>
+              <a:t>6/13/2014</a:t>
             </a:fld>
             <a:endParaRPr lang="en-US"/>
           </a:p>
@@ -2016,7 +2016,7 @@
           <a:p>
             <a:fld id="{AE358F06-F08A-4581-9382-C6FEB46FADBD}" type="datetimeFigureOut">
               <a:rPr lang="en-US" smtClean="0"/>
-              <a:t>6/10/2014</a:t>
+              <a:t>6/13/2014</a:t>
             </a:fld>
             <a:endParaRPr lang="en-US"/>
           </a:p>
@@ -2293,7 +2293,7 @@
           <a:p>
             <a:fld id="{AE358F06-F08A-4581-9382-C6FEB46FADBD}" type="datetimeFigureOut">
               <a:rPr lang="en-US" smtClean="0"/>
-              <a:t>6/10/2014</a:t>
+              <a:t>6/13/2014</a:t>
             </a:fld>
             <a:endParaRPr lang="en-US"/>
           </a:p>
@@ -2546,7 +2546,7 @@
           <a:p>
             <a:fld id="{AE358F06-F08A-4581-9382-C6FEB46FADBD}" type="datetimeFigureOut">
               <a:rPr lang="en-US" smtClean="0"/>
-              <a:t>6/10/2014</a:t>
+              <a:t>6/13/2014</a:t>
             </a:fld>
             <a:endParaRPr lang="en-US"/>
           </a:p>
@@ -2759,7 +2759,7 @@
           <a:p>
             <a:fld id="{AE358F06-F08A-4581-9382-C6FEB46FADBD}" type="datetimeFigureOut">
               <a:rPr lang="en-US" smtClean="0"/>
-              <a:t>6/10/2014</a:t>
+              <a:t>6/13/2014</a:t>
             </a:fld>
             <a:endParaRPr lang="en-US"/>
           </a:p>
@@ -4300,11 +4300,116 @@
           <a:p>
             <a:r>
               <a:rPr lang="en-US" dirty="0" smtClean="0"/>
-              <a:t>Date </a:t>
-            </a:r>
+              <a:t>Date Construction</a:t>
+            </a:r>
+          </a:p>
+          <a:p>
+            <a:pPr lvl="1"/>
+            <a:r>
+              <a:rPr lang="en-US" sz="2000" dirty="0">
+                <a:solidFill>
+                  <a:srgbClr val="000000"/>
+                </a:solidFill>
+                <a:highlight>
+                  <a:srgbClr val="FFFFFF"/>
+                </a:highlight>
+                <a:latin typeface="Consolas" panose="020B0609020204030204" pitchFamily="49" charset="0"/>
+              </a:rPr>
+              <a:t>Date(2014, 1, 1, 12, 0, 0, -6</a:t>
+            </a:r>
+            <a:r>
+              <a:rPr lang="en-US" sz="2000" dirty="0" smtClean="0">
+                <a:solidFill>
+                  <a:srgbClr val="000000"/>
+                </a:solidFill>
+                <a:highlight>
+                  <a:srgbClr val="FFFFFF"/>
+                </a:highlight>
+                <a:latin typeface="Consolas" panose="020B0609020204030204" pitchFamily="49" charset="0"/>
+              </a:rPr>
+              <a:t>)</a:t>
+            </a:r>
+          </a:p>
+          <a:p>
+            <a:pPr lvl="1"/>
+            <a:r>
+              <a:rPr lang="en-US" sz="2000" dirty="0">
+                <a:solidFill>
+                  <a:srgbClr val="0000FF"/>
+                </a:solidFill>
+                <a:highlight>
+                  <a:srgbClr val="FFFFFF"/>
+                </a:highlight>
+                <a:latin typeface="Consolas" panose="020B0609020204030204" pitchFamily="49" charset="0"/>
+              </a:rPr>
+              <a:t>convert</a:t>
+            </a:r>
+            <a:r>
+              <a:rPr lang="en-US" sz="2000" dirty="0">
+                <a:solidFill>
+                  <a:srgbClr val="000000"/>
+                </a:solidFill>
+                <a:highlight>
+                  <a:srgbClr val="FFFFFF"/>
+                </a:highlight>
+                <a:latin typeface="Consolas" panose="020B0609020204030204" pitchFamily="49" charset="0"/>
+              </a:rPr>
+              <a:t> </a:t>
+            </a:r>
+            <a:r>
+              <a:rPr lang="en-US" sz="2000" dirty="0">
+                <a:solidFill>
+                  <a:srgbClr val="A31515"/>
+                </a:solidFill>
+                <a:highlight>
+                  <a:srgbClr val="FFFFFF"/>
+                </a:highlight>
+                <a:latin typeface="Consolas" panose="020B0609020204030204" pitchFamily="49" charset="0"/>
+              </a:rPr>
+              <a:t>"20140101120000-0600"</a:t>
+            </a:r>
+            <a:r>
+              <a:rPr lang="en-US" sz="2000" dirty="0">
+                <a:solidFill>
+                  <a:srgbClr val="000000"/>
+                </a:solidFill>
+                <a:highlight>
+                  <a:srgbClr val="FFFFFF"/>
+                </a:highlight>
+                <a:latin typeface="Consolas" panose="020B0609020204030204" pitchFamily="49" charset="0"/>
+              </a:rPr>
+              <a:t> </a:t>
+            </a:r>
+            <a:r>
+              <a:rPr lang="en-US" sz="2000" dirty="0">
+                <a:solidFill>
+                  <a:srgbClr val="0000FF"/>
+                </a:solidFill>
+                <a:highlight>
+                  <a:srgbClr val="FFFFFF"/>
+                </a:highlight>
+                <a:latin typeface="Consolas" panose="020B0609020204030204" pitchFamily="49" charset="0"/>
+              </a:rPr>
+              <a:t>to</a:t>
+            </a:r>
+            <a:r>
+              <a:rPr lang="en-US" sz="2000" dirty="0">
+                <a:solidFill>
+                  <a:srgbClr val="000000"/>
+                </a:solidFill>
+                <a:highlight>
+                  <a:srgbClr val="FFFFFF"/>
+                </a:highlight>
+                <a:latin typeface="Consolas" panose="020B0609020204030204" pitchFamily="49" charset="0"/>
+              </a:rPr>
+              <a:t> Timestamp</a:t>
+            </a:r>
+            <a:endParaRPr lang="en-US" sz="2000" dirty="0" smtClean="0"/>
+          </a:p>
+          <a:p>
             <a:r>
               <a:rPr lang="en-US" dirty="0" smtClean="0"/>
-              <a:t>Construction</a:t>
+              <a:t>Date Arithmetic</a:t>
             </a:r>
           </a:p>
           <a:p>
@@ -4319,11 +4424,62 @@
                 </a:highlight>
                 <a:latin typeface="Consolas" panose="020B0609020204030204" pitchFamily="49" charset="0"/>
               </a:rPr>
-              <a:t>Date(2014, 1, 1, 12, 0, 0, -6</a:t>
+              <a:t>today + 3 </a:t>
+            </a:r>
+            <a:r>
+              <a:rPr lang="en-US" sz="2000" dirty="0">
+                <a:solidFill>
+                  <a:srgbClr val="0000FF"/>
+                </a:solidFill>
+                <a:highlight>
+                  <a:srgbClr val="FFFFFF"/>
+                </a:highlight>
+                <a:latin typeface="Consolas" panose="020B0609020204030204" pitchFamily="49" charset="0"/>
+              </a:rPr>
+              <a:t>months</a:t>
+            </a:r>
+            <a:r>
+              <a:rPr lang="en-US" sz="2000" dirty="0">
+                <a:solidFill>
+                  <a:srgbClr val="000000"/>
+                </a:solidFill>
+                <a:highlight>
+                  <a:srgbClr val="FFFFFF"/>
+                </a:highlight>
+                <a:latin typeface="Consolas" panose="020B0609020204030204" pitchFamily="49" charset="0"/>
+              </a:rPr>
+              <a:t> - 2 </a:t>
             </a:r>
             <a:r>
               <a:rPr lang="en-US" sz="2000" dirty="0" smtClean="0">
                 <a:solidFill>
+                  <a:srgbClr val="0000FF"/>
+                </a:solidFill>
+                <a:highlight>
+                  <a:srgbClr val="FFFFFF"/>
+                </a:highlight>
+                <a:latin typeface="Consolas" panose="020B0609020204030204" pitchFamily="49" charset="0"/>
+              </a:rPr>
+              <a:t>days</a:t>
+            </a:r>
+          </a:p>
+          <a:p>
+            <a:pPr lvl="1"/>
+            <a:r>
+              <a:rPr lang="en-US" sz="2000" dirty="0">
+                <a:solidFill>
+                  <a:srgbClr val="0000FF"/>
+                </a:solidFill>
+                <a:highlight>
+                  <a:srgbClr val="FFFFFF"/>
+                </a:highlight>
+                <a:latin typeface="Consolas" panose="020B0609020204030204" pitchFamily="49" charset="0"/>
+              </a:rPr>
+              <a:t>months</a:t>
+            </a:r>
+            <a:r>
+              <a:rPr lang="en-US" sz="2000" dirty="0">
+                <a:solidFill>
                   <a:srgbClr val="000000"/>
                 </a:solidFill>
                 <a:highlight>
@@ -4331,7 +4487,134 @@
                 </a:highlight>
                 <a:latin typeface="Consolas" panose="020B0609020204030204" pitchFamily="49" charset="0"/>
               </a:rPr>
-              <a:t>)</a:t>
+              <a:t> between </a:t>
+            </a:r>
+            <a:r>
+              <a:rPr lang="en-US" sz="2000" dirty="0">
+                <a:solidFill>
+                  <a:srgbClr val="0000FF"/>
+                </a:solidFill>
+                <a:highlight>
+                  <a:srgbClr val="FFFFFF"/>
+                </a:highlight>
+                <a:latin typeface="Consolas" panose="020B0609020204030204" pitchFamily="49" charset="0"/>
+              </a:rPr>
+              <a:t>start</a:t>
+            </a:r>
+            <a:r>
+              <a:rPr lang="en-US" sz="2000" dirty="0">
+                <a:solidFill>
+                  <a:srgbClr val="000000"/>
+                </a:solidFill>
+                <a:highlight>
+                  <a:srgbClr val="FFFFFF"/>
+                </a:highlight>
+                <a:latin typeface="Consolas" panose="020B0609020204030204" pitchFamily="49" charset="0"/>
+              </a:rPr>
+              <a:t> </a:t>
+            </a:r>
+            <a:r>
+              <a:rPr lang="en-US" sz="2000" dirty="0">
+                <a:solidFill>
+                  <a:srgbClr val="0000FF"/>
+                </a:solidFill>
+                <a:highlight>
+                  <a:srgbClr val="FFFFFF"/>
+                </a:highlight>
+                <a:latin typeface="Consolas" panose="020B0609020204030204" pitchFamily="49" charset="0"/>
+              </a:rPr>
+              <a:t>of</a:t>
+            </a:r>
+            <a:r>
+              <a:rPr lang="en-US" sz="2000" dirty="0">
+                <a:solidFill>
+                  <a:srgbClr val="000000"/>
+                </a:solidFill>
+                <a:highlight>
+                  <a:srgbClr val="FFFFFF"/>
+                </a:highlight>
+                <a:latin typeface="Consolas" panose="020B0609020204030204" pitchFamily="49" charset="0"/>
+              </a:rPr>
+              <a:t> X </a:t>
+            </a:r>
+            <a:r>
+              <a:rPr lang="en-US" sz="2000" dirty="0">
+                <a:solidFill>
+                  <a:srgbClr val="0000FF"/>
+                </a:solidFill>
+                <a:highlight>
+                  <a:srgbClr val="FFFFFF"/>
+                </a:highlight>
+                <a:latin typeface="Consolas" panose="020B0609020204030204" pitchFamily="49" charset="0"/>
+              </a:rPr>
+              <a:t>and</a:t>
+            </a:r>
+            <a:r>
+              <a:rPr lang="en-US" sz="2000" dirty="0">
+                <a:solidFill>
+                  <a:srgbClr val="000000"/>
+                </a:solidFill>
+                <a:highlight>
+                  <a:srgbClr val="FFFFFF"/>
+                </a:highlight>
+                <a:latin typeface="Consolas" panose="020B0609020204030204" pitchFamily="49" charset="0"/>
+              </a:rPr>
+              <a:t> </a:t>
+            </a:r>
+            <a:r>
+              <a:rPr lang="en-US" sz="2000" dirty="0">
+                <a:solidFill>
+                  <a:srgbClr val="0000FF"/>
+                </a:solidFill>
+                <a:highlight>
+                  <a:srgbClr val="FFFFFF"/>
+                </a:highlight>
+                <a:latin typeface="Consolas" panose="020B0609020204030204" pitchFamily="49" charset="0"/>
+              </a:rPr>
+              <a:t>end</a:t>
+            </a:r>
+            <a:r>
+              <a:rPr lang="en-US" sz="2000" dirty="0">
+                <a:solidFill>
+                  <a:srgbClr val="000000"/>
+                </a:solidFill>
+                <a:highlight>
+                  <a:srgbClr val="FFFFFF"/>
+                </a:highlight>
+                <a:latin typeface="Consolas" panose="020B0609020204030204" pitchFamily="49" charset="0"/>
+              </a:rPr>
+              <a:t> </a:t>
+            </a:r>
+            <a:r>
+              <a:rPr lang="en-US" sz="2000" dirty="0">
+                <a:solidFill>
+                  <a:srgbClr val="0000FF"/>
+                </a:solidFill>
+                <a:highlight>
+                  <a:srgbClr val="FFFFFF"/>
+                </a:highlight>
+                <a:latin typeface="Consolas" panose="020B0609020204030204" pitchFamily="49" charset="0"/>
+              </a:rPr>
+              <a:t>of</a:t>
+            </a:r>
+            <a:r>
+              <a:rPr lang="en-US" sz="2000" dirty="0">
+                <a:solidFill>
+                  <a:srgbClr val="000000"/>
+                </a:solidFill>
+                <a:highlight>
+                  <a:srgbClr val="FFFFFF"/>
+                </a:highlight>
+                <a:latin typeface="Consolas" panose="020B0609020204030204" pitchFamily="49" charset="0"/>
+              </a:rPr>
+              <a:t> X</a:t>
+            </a:r>
+            <a:endParaRPr lang="en-US" sz="2000" dirty="0" smtClean="0"/>
+          </a:p>
+          <a:p>
+            <a:r>
+              <a:rPr lang="en-US" dirty="0" smtClean="0"/>
+              <a:t>Date/Time extraction</a:t>
             </a:r>
           </a:p>
           <a:p>
@@ -4346,7 +4629,7 @@
                 </a:highlight>
                 <a:latin typeface="Consolas" panose="020B0609020204030204" pitchFamily="49" charset="0"/>
               </a:rPr>
-              <a:t>convert</a:t>
+              <a:t>date</a:t>
             </a:r>
             <a:r>
               <a:rPr lang="en-US" sz="2000" dirty="0">
@@ -4363,14 +4646,14 @@
             <a:r>
               <a:rPr lang="en-US" sz="2000" dirty="0">
                 <a:solidFill>
-                  <a:srgbClr val="A31515"/>
-                </a:solidFill>
-                <a:highlight>
-                  <a:srgbClr val="FFFFFF"/>
-                </a:highlight>
-                <a:latin typeface="Consolas" panose="020B0609020204030204" pitchFamily="49" charset="0"/>
-              </a:rPr>
-              <a:t>"20140101120000-0600"</a:t>
+                  <a:srgbClr val="0000FF"/>
+                </a:solidFill>
+                <a:highlight>
+                  <a:srgbClr val="FFFFFF"/>
+                </a:highlight>
+                <a:latin typeface="Consolas" panose="020B0609020204030204" pitchFamily="49" charset="0"/>
+              </a:rPr>
+              <a:t>of</a:t>
             </a:r>
             <a:r>
               <a:rPr lang="en-US" sz="2000" dirty="0">
@@ -4394,7 +4677,7 @@
                 </a:highlight>
                 <a:latin typeface="Consolas" panose="020B0609020204030204" pitchFamily="49" charset="0"/>
               </a:rPr>
-              <a:t>to</a:t>
+              <a:t>start</a:t>
             </a:r>
             <a:r>
               <a:rPr lang="en-US" sz="2000" dirty="0">
@@ -4406,337 +4689,38 @@
                 </a:highlight>
                 <a:latin typeface="Consolas" panose="020B0609020204030204" pitchFamily="49" charset="0"/>
               </a:rPr>
-              <a:t> Timestamp</a:t>
+              <a:t> </a:t>
+            </a:r>
+            <a:r>
+              <a:rPr lang="en-US" sz="2000" dirty="0">
+                <a:solidFill>
+                  <a:srgbClr val="0000FF"/>
+                </a:solidFill>
+                <a:highlight>
+                  <a:srgbClr val="FFFFFF"/>
+                </a:highlight>
+                <a:latin typeface="Consolas" panose="020B0609020204030204" pitchFamily="49" charset="0"/>
+              </a:rPr>
+              <a:t>of</a:t>
+            </a:r>
+            <a:r>
+              <a:rPr lang="en-US" sz="2000" dirty="0">
+                <a:solidFill>
+                  <a:srgbClr val="000000"/>
+                </a:solidFill>
+                <a:highlight>
+                  <a:srgbClr val="FFFFFF"/>
+                </a:highlight>
+                <a:latin typeface="Consolas" panose="020B0609020204030204" pitchFamily="49" charset="0"/>
+              </a:rPr>
+              <a:t> X</a:t>
             </a:r>
             <a:endParaRPr lang="en-US" sz="2000" dirty="0" smtClean="0"/>
           </a:p>
           <a:p>
             <a:r>
               <a:rPr lang="en-US" dirty="0" smtClean="0"/>
-              <a:t>Date </a:t>
-            </a:r>
-            <a:r>
-              <a:rPr lang="en-US" dirty="0" smtClean="0"/>
-              <a:t>Arithmetic</a:t>
-            </a:r>
-          </a:p>
-          <a:p>
-            <a:pPr lvl="1"/>
-            <a:r>
-              <a:rPr lang="en-US" sz="2000" dirty="0">
-                <a:solidFill>
-                  <a:srgbClr val="000000"/>
-                </a:solidFill>
-                <a:highlight>
-                  <a:srgbClr val="FFFFFF"/>
-                </a:highlight>
-                <a:latin typeface="Consolas" panose="020B0609020204030204" pitchFamily="49" charset="0"/>
-              </a:rPr>
-              <a:t>today + 3 </a:t>
-            </a:r>
-            <a:r>
-              <a:rPr lang="en-US" sz="2000" dirty="0">
-                <a:solidFill>
-                  <a:srgbClr val="0000FF"/>
-                </a:solidFill>
-                <a:highlight>
-                  <a:srgbClr val="FFFFFF"/>
-                </a:highlight>
-                <a:latin typeface="Consolas" panose="020B0609020204030204" pitchFamily="49" charset="0"/>
-              </a:rPr>
-              <a:t>months</a:t>
-            </a:r>
-            <a:r>
-              <a:rPr lang="en-US" sz="2000" dirty="0">
-                <a:solidFill>
-                  <a:srgbClr val="000000"/>
-                </a:solidFill>
-                <a:highlight>
-                  <a:srgbClr val="FFFFFF"/>
-                </a:highlight>
-                <a:latin typeface="Consolas" panose="020B0609020204030204" pitchFamily="49" charset="0"/>
-              </a:rPr>
-              <a:t> - 2 </a:t>
-            </a:r>
-            <a:r>
-              <a:rPr lang="en-US" sz="2000" dirty="0" smtClean="0">
-                <a:solidFill>
-                  <a:srgbClr val="0000FF"/>
-                </a:solidFill>
-                <a:highlight>
-                  <a:srgbClr val="FFFFFF"/>
-                </a:highlight>
-                <a:latin typeface="Consolas" panose="020B0609020204030204" pitchFamily="49" charset="0"/>
-              </a:rPr>
-              <a:t>days</a:t>
-            </a:r>
-          </a:p>
-          <a:p>
-            <a:pPr lvl="1"/>
-            <a:r>
-              <a:rPr lang="en-US" sz="2000" dirty="0">
-                <a:solidFill>
-                  <a:srgbClr val="0000FF"/>
-                </a:solidFill>
-                <a:highlight>
-                  <a:srgbClr val="FFFFFF"/>
-                </a:highlight>
-                <a:latin typeface="Consolas" panose="020B0609020204030204" pitchFamily="49" charset="0"/>
-              </a:rPr>
-              <a:t>months</a:t>
-            </a:r>
-            <a:r>
-              <a:rPr lang="en-US" sz="2000" dirty="0">
-                <a:solidFill>
-                  <a:srgbClr val="000000"/>
-                </a:solidFill>
-                <a:highlight>
-                  <a:srgbClr val="FFFFFF"/>
-                </a:highlight>
-                <a:latin typeface="Consolas" panose="020B0609020204030204" pitchFamily="49" charset="0"/>
-              </a:rPr>
-              <a:t> between </a:t>
-            </a:r>
-            <a:r>
-              <a:rPr lang="en-US" sz="2000" dirty="0">
-                <a:solidFill>
-                  <a:srgbClr val="0000FF"/>
-                </a:solidFill>
-                <a:highlight>
-                  <a:srgbClr val="FFFFFF"/>
-                </a:highlight>
-                <a:latin typeface="Consolas" panose="020B0609020204030204" pitchFamily="49" charset="0"/>
-              </a:rPr>
-              <a:t>start</a:t>
-            </a:r>
-            <a:r>
-              <a:rPr lang="en-US" sz="2000" dirty="0">
-                <a:solidFill>
-                  <a:srgbClr val="000000"/>
-                </a:solidFill>
-                <a:highlight>
-                  <a:srgbClr val="FFFFFF"/>
-                </a:highlight>
-                <a:latin typeface="Consolas" panose="020B0609020204030204" pitchFamily="49" charset="0"/>
-              </a:rPr>
-              <a:t> </a:t>
-            </a:r>
-            <a:r>
-              <a:rPr lang="en-US" sz="2000" dirty="0">
-                <a:solidFill>
-                  <a:srgbClr val="0000FF"/>
-                </a:solidFill>
-                <a:highlight>
-                  <a:srgbClr val="FFFFFF"/>
-                </a:highlight>
-                <a:latin typeface="Consolas" panose="020B0609020204030204" pitchFamily="49" charset="0"/>
-              </a:rPr>
-              <a:t>of</a:t>
-            </a:r>
-            <a:r>
-              <a:rPr lang="en-US" sz="2000" dirty="0">
-                <a:solidFill>
-                  <a:srgbClr val="000000"/>
-                </a:solidFill>
-                <a:highlight>
-                  <a:srgbClr val="FFFFFF"/>
-                </a:highlight>
-                <a:latin typeface="Consolas" panose="020B0609020204030204" pitchFamily="49" charset="0"/>
-              </a:rPr>
-              <a:t> X </a:t>
-            </a:r>
-            <a:r>
-              <a:rPr lang="en-US" sz="2000" dirty="0">
-                <a:solidFill>
-                  <a:srgbClr val="0000FF"/>
-                </a:solidFill>
-                <a:highlight>
-                  <a:srgbClr val="FFFFFF"/>
-                </a:highlight>
-                <a:latin typeface="Consolas" panose="020B0609020204030204" pitchFamily="49" charset="0"/>
-              </a:rPr>
-              <a:t>and</a:t>
-            </a:r>
-            <a:r>
-              <a:rPr lang="en-US" sz="2000" dirty="0">
-                <a:solidFill>
-                  <a:srgbClr val="000000"/>
-                </a:solidFill>
-                <a:highlight>
-                  <a:srgbClr val="FFFFFF"/>
-                </a:highlight>
-                <a:latin typeface="Consolas" panose="020B0609020204030204" pitchFamily="49" charset="0"/>
-              </a:rPr>
-              <a:t> </a:t>
-            </a:r>
-            <a:r>
-              <a:rPr lang="en-US" sz="2000" dirty="0">
-                <a:solidFill>
-                  <a:srgbClr val="0000FF"/>
-                </a:solidFill>
-                <a:highlight>
-                  <a:srgbClr val="FFFFFF"/>
-                </a:highlight>
-                <a:latin typeface="Consolas" panose="020B0609020204030204" pitchFamily="49" charset="0"/>
-              </a:rPr>
-              <a:t>end</a:t>
-            </a:r>
-            <a:r>
-              <a:rPr lang="en-US" sz="2000" dirty="0">
-                <a:solidFill>
-                  <a:srgbClr val="000000"/>
-                </a:solidFill>
-                <a:highlight>
-                  <a:srgbClr val="FFFFFF"/>
-                </a:highlight>
-                <a:latin typeface="Consolas" panose="020B0609020204030204" pitchFamily="49" charset="0"/>
-              </a:rPr>
-              <a:t> </a:t>
-            </a:r>
-            <a:r>
-              <a:rPr lang="en-US" sz="2000" dirty="0">
-                <a:solidFill>
-                  <a:srgbClr val="0000FF"/>
-                </a:solidFill>
-                <a:highlight>
-                  <a:srgbClr val="FFFFFF"/>
-                </a:highlight>
-                <a:latin typeface="Consolas" panose="020B0609020204030204" pitchFamily="49" charset="0"/>
-              </a:rPr>
-              <a:t>of</a:t>
-            </a:r>
-            <a:r>
-              <a:rPr lang="en-US" sz="2000" dirty="0">
-                <a:solidFill>
-                  <a:srgbClr val="000000"/>
-                </a:solidFill>
-                <a:highlight>
-                  <a:srgbClr val="FFFFFF"/>
-                </a:highlight>
-                <a:latin typeface="Consolas" panose="020B0609020204030204" pitchFamily="49" charset="0"/>
-              </a:rPr>
-              <a:t> X</a:t>
-            </a:r>
-            <a:endParaRPr lang="en-US" sz="2000" dirty="0" smtClean="0"/>
-          </a:p>
-          <a:p>
-            <a:r>
-              <a:rPr lang="en-US" dirty="0" smtClean="0"/>
-              <a:t>Date/Time </a:t>
-            </a:r>
-            <a:r>
-              <a:rPr lang="en-US" dirty="0" smtClean="0"/>
-              <a:t>extraction</a:t>
-            </a:r>
-          </a:p>
-          <a:p>
-            <a:pPr lvl="1"/>
-            <a:r>
-              <a:rPr lang="en-US" sz="2000" dirty="0">
-                <a:solidFill>
-                  <a:srgbClr val="0000FF"/>
-                </a:solidFill>
-                <a:highlight>
-                  <a:srgbClr val="FFFFFF"/>
-                </a:highlight>
-                <a:latin typeface="Consolas" panose="020B0609020204030204" pitchFamily="49" charset="0"/>
-              </a:rPr>
-              <a:t>date</a:t>
-            </a:r>
-            <a:r>
-              <a:rPr lang="en-US" sz="2000" dirty="0">
-                <a:solidFill>
-                  <a:srgbClr val="000000"/>
-                </a:solidFill>
-                <a:highlight>
-                  <a:srgbClr val="FFFFFF"/>
-                </a:highlight>
-                <a:latin typeface="Consolas" panose="020B0609020204030204" pitchFamily="49" charset="0"/>
-              </a:rPr>
-              <a:t> </a:t>
-            </a:r>
-            <a:r>
-              <a:rPr lang="en-US" sz="2000" dirty="0">
-                <a:solidFill>
-                  <a:srgbClr val="0000FF"/>
-                </a:solidFill>
-                <a:highlight>
-                  <a:srgbClr val="FFFFFF"/>
-                </a:highlight>
-                <a:latin typeface="Consolas" panose="020B0609020204030204" pitchFamily="49" charset="0"/>
-              </a:rPr>
-              <a:t>of</a:t>
-            </a:r>
-            <a:r>
-              <a:rPr lang="en-US" sz="2000" dirty="0">
-                <a:solidFill>
-                  <a:srgbClr val="000000"/>
-                </a:solidFill>
-                <a:highlight>
-                  <a:srgbClr val="FFFFFF"/>
-                </a:highlight>
-                <a:latin typeface="Consolas" panose="020B0609020204030204" pitchFamily="49" charset="0"/>
-              </a:rPr>
-              <a:t> </a:t>
-            </a:r>
-            <a:r>
-              <a:rPr lang="en-US" sz="2000" dirty="0">
-                <a:solidFill>
-                  <a:srgbClr val="0000FF"/>
-                </a:solidFill>
-                <a:highlight>
-                  <a:srgbClr val="FFFFFF"/>
-                </a:highlight>
-                <a:latin typeface="Consolas" panose="020B0609020204030204" pitchFamily="49" charset="0"/>
-              </a:rPr>
-              <a:t>start</a:t>
-            </a:r>
-            <a:r>
-              <a:rPr lang="en-US" sz="2000" dirty="0">
-                <a:solidFill>
-                  <a:srgbClr val="000000"/>
-                </a:solidFill>
-                <a:highlight>
-                  <a:srgbClr val="FFFFFF"/>
-                </a:highlight>
-                <a:latin typeface="Consolas" panose="020B0609020204030204" pitchFamily="49" charset="0"/>
-              </a:rPr>
-              <a:t> </a:t>
-            </a:r>
-            <a:r>
-              <a:rPr lang="en-US" sz="2000" dirty="0">
-                <a:solidFill>
-                  <a:srgbClr val="0000FF"/>
-                </a:solidFill>
-                <a:highlight>
-                  <a:srgbClr val="FFFFFF"/>
-                </a:highlight>
-                <a:latin typeface="Consolas" panose="020B0609020204030204" pitchFamily="49" charset="0"/>
-              </a:rPr>
-              <a:t>of</a:t>
-            </a:r>
-            <a:r>
-              <a:rPr lang="en-US" sz="2000" dirty="0">
-                <a:solidFill>
-                  <a:srgbClr val="000000"/>
-                </a:solidFill>
-                <a:highlight>
-                  <a:srgbClr val="FFFFFF"/>
-                </a:highlight>
-                <a:latin typeface="Consolas" panose="020B0609020204030204" pitchFamily="49" charset="0"/>
-              </a:rPr>
-              <a:t> X</a:t>
-            </a:r>
-            <a:endParaRPr lang="en-US" sz="2000" dirty="0" smtClean="0"/>
-          </a:p>
-          <a:p>
-            <a:r>
-              <a:rPr lang="en-US" dirty="0" smtClean="0"/>
-              <a:t>Component </a:t>
-            </a:r>
-            <a:r>
-              <a:rPr lang="en-US" dirty="0" smtClean="0"/>
-              <a:t>extraction</a:t>
+              <a:t>Component extraction</a:t>
             </a:r>
           </a:p>
           <a:p>
@@ -5946,7 +5930,7 @@
         <p:spPr/>
         <p:txBody>
           <a:bodyPr>
-            <a:normAutofit fontScale="85000" lnSpcReduction="10000"/>
+            <a:normAutofit fontScale="85000" lnSpcReduction="20000"/>
           </a:bodyPr>
           <a:lstStyle/>
           <a:p>
@@ -6030,8 +6014,33 @@
               <a:t>cqframework</a:t>
             </a:r>
             <a:r>
-              <a:rPr lang="en-US" smtClean="0"/>
-              <a:t> repository</a:t>
+              <a:rPr lang="en-US" dirty="0" smtClean="0"/>
+              <a:t> </a:t>
+            </a:r>
+            <a:r>
+              <a:rPr lang="en-US" dirty="0" smtClean="0"/>
+              <a:t>repository</a:t>
+            </a:r>
+          </a:p>
+          <a:p>
+            <a:pPr lvl="1"/>
+            <a:r>
+              <a:rPr lang="en-US">
+                <a:hlinkClick r:id="rId3"/>
+              </a:rPr>
+              <a:t>https</a:t>
+            </a:r>
+            <a:r>
+              <a:rPr lang="en-US">
+                <a:hlinkClick r:id="rId3"/>
+              </a:rPr>
+              <a:t>://</a:t>
+            </a:r>
+            <a:r>
+              <a:rPr lang="en-US" smtClean="0">
+                <a:hlinkClick r:id="rId3"/>
+              </a:rPr>
+              <a:t>github.com/cqframework/OneModel</a:t>
             </a:r>
             <a:endParaRPr lang="en-US" dirty="0" smtClean="0"/>
           </a:p>
@@ -7274,8 +7283,12 @@
           <a:p>
             <a:pPr algn="ctr"/>
             <a:r>
-              <a:rPr lang="en-US" smtClean="0"/>
-              <a:t>Concepts defined in Quality Logical Model</a:t>
+              <a:rPr lang="en-US" dirty="0" smtClean="0"/>
+              <a:t>Concepts defined in Quality Logical </a:t>
+            </a:r>
+            <a:r>
+              <a:rPr lang="en-US" dirty="0" smtClean="0"/>
+              <a:t>Model (QUICK)</a:t>
             </a:r>
             <a:endParaRPr lang="en-US" dirty="0"/>
           </a:p>
@@ -8515,11 +8528,7 @@
             <a:pPr lvl="1"/>
             <a:r>
               <a:rPr lang="en-US" dirty="0" smtClean="0"/>
-              <a:t>Define available “inputs</a:t>
-            </a:r>
-            <a:r>
-              <a:rPr lang="en-US" dirty="0" smtClean="0"/>
-              <a:t>” (and potentially “outputs”, TBD)</a:t>
+              <a:t>Define available “inputs” (and potentially “outputs”, TBD)</a:t>
             </a:r>
             <a:endParaRPr lang="en-US" b="1" dirty="0" smtClean="0"/>
           </a:p>
@@ -8537,11 +8546,7 @@
             <a:pPr lvl="1"/>
             <a:r>
               <a:rPr lang="en-US" dirty="0" smtClean="0"/>
-              <a:t>Define </a:t>
-            </a:r>
-            <a:r>
-              <a:rPr lang="en-US" dirty="0" smtClean="0"/>
-              <a:t>user-friendly labels for value sets within the library</a:t>
+              <a:t>Define user-friendly labels for value sets within the library</a:t>
             </a:r>
           </a:p>
         </p:txBody>
@@ -8670,7 +8675,11 @@
           <a:p>
             <a:r>
               <a:rPr lang="en-US" dirty="0" smtClean="0"/>
-              <a:t>QILM Statement Structure</a:t>
+              <a:t>QUICK Statement </a:t>
+            </a:r>
+            <a:r>
+              <a:rPr lang="en-US" dirty="0" smtClean="0"/>
+              <a:t>Structure</a:t>
             </a:r>
             <a:endParaRPr lang="en-US" dirty="0"/>
           </a:p>
@@ -8770,27 +8779,15 @@
           <a:p>
             <a:r>
               <a:rPr lang="en-US" dirty="0" smtClean="0"/>
-              <a:t>In </a:t>
+              <a:t>In addition</a:t>
+            </a:r>
+            <a:r>
+              <a:rPr lang="en-US" smtClean="0"/>
+              <a:t>, Acts have </a:t>
             </a:r>
             <a:r>
               <a:rPr lang="en-US" dirty="0" smtClean="0"/>
-              <a:t>addition</a:t>
-            </a:r>
-            <a:r>
-              <a:rPr lang="en-US" smtClean="0"/>
-              <a:t>, </a:t>
-            </a:r>
-            <a:r>
-              <a:rPr lang="en-US" smtClean="0"/>
-              <a:t>Acts have </a:t>
-            </a:r>
-            <a:r>
-              <a:rPr lang="en-US" dirty="0" smtClean="0"/>
-              <a:t>Modality</a:t>
-            </a:r>
-            <a:r>
-              <a:rPr lang="en-US" dirty="0" smtClean="0"/>
-              <a:t>:</a:t>
+              <a:t>Modality:</a:t>
             </a:r>
           </a:p>
           <a:p>
@@ -8896,11 +8893,7 @@
           <a:p>
             <a:r>
               <a:rPr lang="en-US" dirty="0" smtClean="0"/>
-              <a:t>Specified in terms of Data </a:t>
-            </a:r>
-            <a:r>
-              <a:rPr lang="en-US" dirty="0" smtClean="0"/>
-              <a:t>Model</a:t>
+              <a:t>Specified in terms of Data Model</a:t>
             </a:r>
           </a:p>
           <a:p>

</xml_diff>

<commit_message>
Updating CQL slide decks.
</commit_message>
<xml_diff>
--- a/CQL/Documents/CQL_Technical_Introduction_20140604.pptx
+++ b/CQL/Documents/CQL_Technical_Introduction_20140604.pptx
@@ -6025,19 +6025,13 @@
           <a:p>
             <a:pPr lvl="1"/>
             <a:r>
-              <a:rPr lang="en-US">
+              <a:rPr lang="en-US" dirty="0">
                 <a:hlinkClick r:id="rId3"/>
               </a:rPr>
-              <a:t>https</a:t>
-            </a:r>
-            <a:r>
-              <a:rPr lang="en-US">
-                <a:hlinkClick r:id="rId3"/>
-              </a:rPr>
-              <a:t>://</a:t>
-            </a:r>
-            <a:r>
-              <a:rPr lang="en-US" smtClean="0">
+              <a:t>https://</a:t>
+            </a:r>
+            <a:r>
+              <a:rPr lang="en-US" dirty="0" smtClean="0">
                 <a:hlinkClick r:id="rId3"/>
               </a:rPr>
               <a:t>github.com/cqframework/OneModel</a:t>

</xml_diff>

<commit_message>
Committed latest changes to CQL grammar. Updated examples based on latest CQL (added precision-based timing comparisons and new syntax for occurrence axis of the retrieve).
</commit_message>
<xml_diff>
--- a/CQL/Documents/CQL_Technical_Introduction_20140604.pptx
+++ b/CQL/Documents/CQL_Technical_Introduction_20140604.pptx
@@ -331,7 +331,7 @@
           <a:p>
             <a:fld id="{AE358F06-F08A-4581-9382-C6FEB46FADBD}" type="datetimeFigureOut">
               <a:rPr lang="en-US" smtClean="0"/>
-              <a:t>6/25/2014</a:t>
+              <a:t>7/21/2014</a:t>
             </a:fld>
             <a:endParaRPr lang="en-US"/>
           </a:p>
@@ -501,7 +501,7 @@
           <a:p>
             <a:fld id="{AE358F06-F08A-4581-9382-C6FEB46FADBD}" type="datetimeFigureOut">
               <a:rPr lang="en-US" smtClean="0"/>
-              <a:t>6/25/2014</a:t>
+              <a:t>7/21/2014</a:t>
             </a:fld>
             <a:endParaRPr lang="en-US"/>
           </a:p>
@@ -681,7 +681,7 @@
           <a:p>
             <a:fld id="{AE358F06-F08A-4581-9382-C6FEB46FADBD}" type="datetimeFigureOut">
               <a:rPr lang="en-US" smtClean="0"/>
-              <a:t>6/25/2014</a:t>
+              <a:t>7/21/2014</a:t>
             </a:fld>
             <a:endParaRPr lang="en-US"/>
           </a:p>
@@ -851,7 +851,7 @@
           <a:p>
             <a:fld id="{AE358F06-F08A-4581-9382-C6FEB46FADBD}" type="datetimeFigureOut">
               <a:rPr lang="en-US" smtClean="0"/>
-              <a:t>6/25/2014</a:t>
+              <a:t>7/21/2014</a:t>
             </a:fld>
             <a:endParaRPr lang="en-US"/>
           </a:p>
@@ -1097,7 +1097,7 @@
           <a:p>
             <a:fld id="{AE358F06-F08A-4581-9382-C6FEB46FADBD}" type="datetimeFigureOut">
               <a:rPr lang="en-US" smtClean="0"/>
-              <a:t>6/25/2014</a:t>
+              <a:t>7/21/2014</a:t>
             </a:fld>
             <a:endParaRPr lang="en-US"/>
           </a:p>
@@ -1385,7 +1385,7 @@
           <a:p>
             <a:fld id="{AE358F06-F08A-4581-9382-C6FEB46FADBD}" type="datetimeFigureOut">
               <a:rPr lang="en-US" smtClean="0"/>
-              <a:t>6/25/2014</a:t>
+              <a:t>7/21/2014</a:t>
             </a:fld>
             <a:endParaRPr lang="en-US"/>
           </a:p>
@@ -1807,7 +1807,7 @@
           <a:p>
             <a:fld id="{AE358F06-F08A-4581-9382-C6FEB46FADBD}" type="datetimeFigureOut">
               <a:rPr lang="en-US" smtClean="0"/>
-              <a:t>6/25/2014</a:t>
+              <a:t>7/21/2014</a:t>
             </a:fld>
             <a:endParaRPr lang="en-US"/>
           </a:p>
@@ -1925,7 +1925,7 @@
           <a:p>
             <a:fld id="{AE358F06-F08A-4581-9382-C6FEB46FADBD}" type="datetimeFigureOut">
               <a:rPr lang="en-US" smtClean="0"/>
-              <a:t>6/25/2014</a:t>
+              <a:t>7/21/2014</a:t>
             </a:fld>
             <a:endParaRPr lang="en-US"/>
           </a:p>
@@ -2020,7 +2020,7 @@
           <a:p>
             <a:fld id="{AE358F06-F08A-4581-9382-C6FEB46FADBD}" type="datetimeFigureOut">
               <a:rPr lang="en-US" smtClean="0"/>
-              <a:t>6/25/2014</a:t>
+              <a:t>7/21/2014</a:t>
             </a:fld>
             <a:endParaRPr lang="en-US"/>
           </a:p>
@@ -2297,7 +2297,7 @@
           <a:p>
             <a:fld id="{AE358F06-F08A-4581-9382-C6FEB46FADBD}" type="datetimeFigureOut">
               <a:rPr lang="en-US" smtClean="0"/>
-              <a:t>6/25/2014</a:t>
+              <a:t>7/21/2014</a:t>
             </a:fld>
             <a:endParaRPr lang="en-US"/>
           </a:p>
@@ -2550,7 +2550,7 @@
           <a:p>
             <a:fld id="{AE358F06-F08A-4581-9382-C6FEB46FADBD}" type="datetimeFigureOut">
               <a:rPr lang="en-US" smtClean="0"/>
-              <a:t>6/25/2014</a:t>
+              <a:t>7/21/2014</a:t>
             </a:fld>
             <a:endParaRPr lang="en-US"/>
           </a:p>
@@ -2763,7 +2763,7 @@
           <a:p>
             <a:fld id="{AE358F06-F08A-4581-9382-C6FEB46FADBD}" type="datetimeFigureOut">
               <a:rPr lang="en-US" smtClean="0"/>
-              <a:t>6/25/2014</a:t>
+              <a:t>7/21/2014</a:t>
             </a:fld>
             <a:endParaRPr lang="en-US"/>
           </a:p>
@@ -4340,7 +4340,7 @@
             <p:ph idx="1"/>
             <p:extLst>
               <p:ext uri="{D42A27DB-BD31-4B8C-83A1-F6EECF244321}">
-                <p14:modId xmlns:p14="http://schemas.microsoft.com/office/powerpoint/2010/main" val="3751426252"/>
+                <p14:modId xmlns:p14="http://schemas.microsoft.com/office/powerpoint/2010/main" val="142993698"/>
               </p:ext>
             </p:extLst>
           </p:nvPr>
@@ -4353,7 +4353,7 @@
           <a:graphicData uri="http://schemas.openxmlformats.org/drawingml/2006/table">
             <a:tbl>
               <a:tblPr firstRow="1" bandRow="1">
-                <a:tableStyleId>{5C22544A-7EE6-4342-B048-85BDC9FD1C3A}</a:tableStyleId>
+                <a:tableStyleId>{073A0DAA-6AF3-43AB-8588-CEC1D06C72B9}</a:tableStyleId>
               </a:tblPr>
               <a:tblGrid>
                 <a:gridCol w="2362200"/>
@@ -4412,13 +4412,29 @@
                     <a:p>
                       <a:r>
                         <a:rPr lang="en-US" dirty="0" smtClean="0"/>
-                        <a:t>X concurrent with Y</a:t>
+                        <a:t>X </a:t>
+                      </a:r>
+                      <a:r>
+                        <a:rPr lang="en-US" dirty="0" smtClean="0"/>
+                        <a:t>same as </a:t>
+                      </a:r>
+                      <a:r>
+                        <a:rPr lang="en-US" dirty="0" smtClean="0"/>
+                        <a:t>Y</a:t>
                       </a:r>
                     </a:p>
                     <a:p>
                       <a:r>
                         <a:rPr lang="en-US" dirty="0" smtClean="0"/>
-                        <a:t>Y concurrent with X</a:t>
+                        <a:t>Y </a:t>
+                      </a:r>
+                      <a:r>
+                        <a:rPr lang="en-US" dirty="0" smtClean="0"/>
+                        <a:t>same as </a:t>
+                      </a:r>
+                      <a:r>
+                        <a:rPr lang="en-US" dirty="0" smtClean="0"/>
+                        <a:t>X</a:t>
                       </a:r>
                       <a:endParaRPr lang="en-US" dirty="0"/>
                     </a:p>
@@ -4956,7 +4972,6 @@
                 <a:rPr lang="en-US" dirty="0"/>
                 <a:t>Y</a:t>
               </a:r>
-              <a:endParaRPr lang="en-US" dirty="0"/>
             </a:p>
           </p:txBody>
         </p:sp>
@@ -5106,7 +5121,6 @@
                 <a:rPr lang="en-US" dirty="0"/>
                 <a:t>Y</a:t>
               </a:r>
-              <a:endParaRPr lang="en-US" dirty="0"/>
             </a:p>
           </p:txBody>
         </p:sp>
@@ -5256,7 +5270,6 @@
                 <a:rPr lang="en-US" dirty="0"/>
                 <a:t>Y</a:t>
               </a:r>
-              <a:endParaRPr lang="en-US" dirty="0"/>
             </a:p>
           </p:txBody>
         </p:sp>
@@ -5406,7 +5419,6 @@
                 <a:rPr lang="en-US" dirty="0"/>
                 <a:t>Y</a:t>
               </a:r>
-              <a:endParaRPr lang="en-US" dirty="0"/>
             </a:p>
           </p:txBody>
         </p:sp>
@@ -5556,7 +5568,6 @@
                 <a:rPr lang="en-US" dirty="0"/>
                 <a:t>Y</a:t>
               </a:r>
-              <a:endParaRPr lang="en-US" dirty="0"/>
             </a:p>
           </p:txBody>
         </p:sp>
@@ -5706,7 +5717,6 @@
                 <a:rPr lang="en-US" dirty="0"/>
                 <a:t>Y</a:t>
               </a:r>
-              <a:endParaRPr lang="en-US" dirty="0"/>
             </a:p>
           </p:txBody>
         </p:sp>
@@ -5856,7 +5866,6 @@
                 <a:rPr lang="en-US" dirty="0"/>
                 <a:t>Y</a:t>
               </a:r>
-              <a:endParaRPr lang="en-US" dirty="0"/>
             </a:p>
           </p:txBody>
         </p:sp>
@@ -8711,11 +8720,7 @@
             <a:pPr lvl="1"/>
             <a:r>
               <a:rPr lang="en-US" smtClean="0"/>
-              <a:t>Mapping </a:t>
-            </a:r>
-            <a:r>
-              <a:rPr lang="en-US" smtClean="0"/>
-              <a:t>QUICK </a:t>
+              <a:t>Mapping QUICK </a:t>
             </a:r>
             <a:r>
               <a:rPr lang="en-US" dirty="0" smtClean="0"/>
@@ -11206,9 +11211,26 @@
         <p:spPr/>
         <p:txBody>
           <a:bodyPr>
-            <a:normAutofit fontScale="77500" lnSpcReduction="20000"/>
+            <a:normAutofit fontScale="70000" lnSpcReduction="20000"/>
           </a:bodyPr>
           <a:lstStyle/>
+          <a:p>
+            <a:r>
+              <a:rPr lang="en-US" b="1" dirty="0" smtClean="0"/>
+              <a:t>library </a:t>
+            </a:r>
+            <a:r>
+              <a:rPr lang="en-US" dirty="0" smtClean="0"/>
+              <a:t>declaration</a:t>
+            </a:r>
+          </a:p>
+          <a:p>
+            <a:pPr lvl="1"/>
+            <a:r>
+              <a:rPr lang="en-US" dirty="0" smtClean="0"/>
+              <a:t>Defines the name and optional version of the library</a:t>
+            </a:r>
+          </a:p>
           <a:p>
             <a:r>
               <a:rPr lang="en-US" b="1" dirty="0" smtClean="0"/>
@@ -11366,7 +11388,7 @@
       </p:sp>
       <p:pic>
         <p:nvPicPr>
-          <p:cNvPr id="4" name="Picture 3"/>
+          <p:cNvPr id="3" name="Picture 2"/>
           <p:cNvPicPr>
             <a:picLocks noChangeAspect="1"/>
           </p:cNvPicPr>
@@ -11380,8 +11402,8 @@
         </p:blipFill>
         <p:spPr>
           <a:xfrm>
-            <a:off x="1111045" y="2209800"/>
-            <a:ext cx="6921910" cy="2438400"/>
+            <a:off x="1143495" y="2057400"/>
+            <a:ext cx="6857010" cy="2971800"/>
           </a:xfrm>
           <a:prstGeom prst="rect">
             <a:avLst/>

</xml_diff>

<commit_message>
Added scratchpad to examples.
</commit_message>
<xml_diff>
--- a/CQL/Documents/CQL_Technical_Introduction_20140604.pptx
+++ b/CQL/Documents/CQL_Technical_Introduction_20140604.pptx
@@ -331,7 +331,7 @@
           <a:p>
             <a:fld id="{AE358F06-F08A-4581-9382-C6FEB46FADBD}" type="datetimeFigureOut">
               <a:rPr lang="en-US" smtClean="0"/>
-              <a:t>7/21/2014</a:t>
+              <a:t>7/30/2014</a:t>
             </a:fld>
             <a:endParaRPr lang="en-US"/>
           </a:p>
@@ -501,7 +501,7 @@
           <a:p>
             <a:fld id="{AE358F06-F08A-4581-9382-C6FEB46FADBD}" type="datetimeFigureOut">
               <a:rPr lang="en-US" smtClean="0"/>
-              <a:t>7/21/2014</a:t>
+              <a:t>7/30/2014</a:t>
             </a:fld>
             <a:endParaRPr lang="en-US"/>
           </a:p>
@@ -681,7 +681,7 @@
           <a:p>
             <a:fld id="{AE358F06-F08A-4581-9382-C6FEB46FADBD}" type="datetimeFigureOut">
               <a:rPr lang="en-US" smtClean="0"/>
-              <a:t>7/21/2014</a:t>
+              <a:t>7/30/2014</a:t>
             </a:fld>
             <a:endParaRPr lang="en-US"/>
           </a:p>
@@ -851,7 +851,7 @@
           <a:p>
             <a:fld id="{AE358F06-F08A-4581-9382-C6FEB46FADBD}" type="datetimeFigureOut">
               <a:rPr lang="en-US" smtClean="0"/>
-              <a:t>7/21/2014</a:t>
+              <a:t>7/30/2014</a:t>
             </a:fld>
             <a:endParaRPr lang="en-US"/>
           </a:p>
@@ -1097,7 +1097,7 @@
           <a:p>
             <a:fld id="{AE358F06-F08A-4581-9382-C6FEB46FADBD}" type="datetimeFigureOut">
               <a:rPr lang="en-US" smtClean="0"/>
-              <a:t>7/21/2014</a:t>
+              <a:t>7/30/2014</a:t>
             </a:fld>
             <a:endParaRPr lang="en-US"/>
           </a:p>
@@ -1385,7 +1385,7 @@
           <a:p>
             <a:fld id="{AE358F06-F08A-4581-9382-C6FEB46FADBD}" type="datetimeFigureOut">
               <a:rPr lang="en-US" smtClean="0"/>
-              <a:t>7/21/2014</a:t>
+              <a:t>7/30/2014</a:t>
             </a:fld>
             <a:endParaRPr lang="en-US"/>
           </a:p>
@@ -1807,7 +1807,7 @@
           <a:p>
             <a:fld id="{AE358F06-F08A-4581-9382-C6FEB46FADBD}" type="datetimeFigureOut">
               <a:rPr lang="en-US" smtClean="0"/>
-              <a:t>7/21/2014</a:t>
+              <a:t>7/30/2014</a:t>
             </a:fld>
             <a:endParaRPr lang="en-US"/>
           </a:p>
@@ -1925,7 +1925,7 @@
           <a:p>
             <a:fld id="{AE358F06-F08A-4581-9382-C6FEB46FADBD}" type="datetimeFigureOut">
               <a:rPr lang="en-US" smtClean="0"/>
-              <a:t>7/21/2014</a:t>
+              <a:t>7/30/2014</a:t>
             </a:fld>
             <a:endParaRPr lang="en-US"/>
           </a:p>
@@ -2020,7 +2020,7 @@
           <a:p>
             <a:fld id="{AE358F06-F08A-4581-9382-C6FEB46FADBD}" type="datetimeFigureOut">
               <a:rPr lang="en-US" smtClean="0"/>
-              <a:t>7/21/2014</a:t>
+              <a:t>7/30/2014</a:t>
             </a:fld>
             <a:endParaRPr lang="en-US"/>
           </a:p>
@@ -2297,7 +2297,7 @@
           <a:p>
             <a:fld id="{AE358F06-F08A-4581-9382-C6FEB46FADBD}" type="datetimeFigureOut">
               <a:rPr lang="en-US" smtClean="0"/>
-              <a:t>7/21/2014</a:t>
+              <a:t>7/30/2014</a:t>
             </a:fld>
             <a:endParaRPr lang="en-US"/>
           </a:p>
@@ -2550,7 +2550,7 @@
           <a:p>
             <a:fld id="{AE358F06-F08A-4581-9382-C6FEB46FADBD}" type="datetimeFigureOut">
               <a:rPr lang="en-US" smtClean="0"/>
-              <a:t>7/21/2014</a:t>
+              <a:t>7/30/2014</a:t>
             </a:fld>
             <a:endParaRPr lang="en-US"/>
           </a:p>
@@ -2763,7 +2763,7 @@
           <a:p>
             <a:fld id="{AE358F06-F08A-4581-9382-C6FEB46FADBD}" type="datetimeFigureOut">
               <a:rPr lang="en-US" smtClean="0"/>
-              <a:t>7/21/2014</a:t>
+              <a:t>7/30/2014</a:t>
             </a:fld>
             <a:endParaRPr lang="en-US"/>
           </a:p>
@@ -4412,29 +4412,13 @@
                     <a:p>
                       <a:r>
                         <a:rPr lang="en-US" dirty="0" smtClean="0"/>
-                        <a:t>X </a:t>
-                      </a:r>
-                      <a:r>
-                        <a:rPr lang="en-US" dirty="0" smtClean="0"/>
-                        <a:t>same as </a:t>
-                      </a:r>
-                      <a:r>
-                        <a:rPr lang="en-US" dirty="0" smtClean="0"/>
-                        <a:t>Y</a:t>
+                        <a:t>X same as Y</a:t>
                       </a:r>
                     </a:p>
                     <a:p>
                       <a:r>
                         <a:rPr lang="en-US" dirty="0" smtClean="0"/>
-                        <a:t>Y </a:t>
-                      </a:r>
-                      <a:r>
-                        <a:rPr lang="en-US" dirty="0" smtClean="0"/>
-                        <a:t>same as </a:t>
-                      </a:r>
-                      <a:r>
-                        <a:rPr lang="en-US" dirty="0" smtClean="0"/>
-                        <a:t>X</a:t>
+                        <a:t>Y same as X</a:t>
                       </a:r>
                       <a:endParaRPr lang="en-US" dirty="0"/>
                     </a:p>

</xml_diff>